<commit_message>
modified:   source/container-vs-public/index.rst 	modified:   source/container-vs-public/public_ip.png 	modified:   source/container-vs-public/public_ip.pptx
</commit_message>
<xml_diff>
--- a/source/container-vs-public/public_ip.pptx
+++ b/source/container-vs-public/public_ip.pptx
@@ -3433,7 +3433,7 @@
         <p:spPr>
           <a:xfrm>
             <a:off x="2831302" y="3156939"/>
-            <a:ext cx="1291700" cy="369332"/>
+            <a:ext cx="1104661" cy="369332"/>
           </a:xfrm>
           <a:prstGeom prst="rect">
             <a:avLst/>
@@ -3448,7 +3448,7 @@
           <a:p>
             <a:r>
               <a:rPr lang="sv-SE"/>
-              <a:t>Edge Server</a:t>
+              <a:t>Container</a:t>
             </a:r>
             <a:endParaRPr lang="en-SE"/>
           </a:p>

</xml_diff>